<commit_message>
final version as presented
</commit_message>
<xml_diff>
--- a/Beyond Scratch Basics week2.pptx
+++ b/Beyond Scratch Basics week2.pptx
@@ -120,7 +120,7 @@
   </p:defaultTextStyle>
   <p:extLst>
     <p:ext uri="{EFAFB233-063F-42B5-8137-9DF3F51BA10A}">
-      <p15:sldGuideLst xmlns="" xmlns:p15="http://schemas.microsoft.com/office/powerpoint/2012/main">
+      <p15:sldGuideLst xmlns:p15="http://schemas.microsoft.com/office/powerpoint/2012/main" xmlns="">
         <p15:guide id="1" orient="horz" pos="2160">
           <p15:clr>
             <a:srgbClr val="A4A3A4"/>
@@ -4795,7 +4795,6 @@
               <a:rPr lang="en-US" sz="2000" dirty="0" smtClean="0"/>
               <a:t>If you want to show off your projects, share them to </a:t>
             </a:r>
-            <a:endParaRPr lang="en-US" sz="2000" dirty="0" smtClean="0"/>
           </a:p>
           <a:p>
             <a:pPr marL="0" indent="0">
@@ -5091,11 +5090,7 @@
           <a:p>
             <a:r>
               <a:rPr lang="en-US" sz="3600" b="1" dirty="0" smtClean="0"/>
-              <a:t>Next week: more </a:t>
-            </a:r>
-            <a:r>
-              <a:rPr lang="en-US" sz="3600" b="1" dirty="0" smtClean="0"/>
-              <a:t>fun with cloning</a:t>
+              <a:t>Next week: more fun with cloning</a:t>
             </a:r>
             <a:endParaRPr lang="en-US" sz="3600" b="1" dirty="0"/>
           </a:p>
@@ -5192,11 +5187,7 @@
             </a:pPr>
             <a:r>
               <a:rPr lang="en-US" dirty="0" smtClean="0"/>
-              <a:t>Here’s a mostly finished version</a:t>
-            </a:r>
-            <a:r>
-              <a:rPr lang="en-US" dirty="0" smtClean="0"/>
-              <a:t>:</a:t>
+              <a:t>Here’s a mostly finished version:</a:t>
             </a:r>
           </a:p>
           <a:p>
@@ -5571,7 +5562,20 @@
             </a:pPr>
             <a:r>
               <a:rPr lang="en-US" dirty="0" smtClean="0"/>
-              <a:t>Let’s look at the tester and try your solution</a:t>
+              <a:t>Let’s look at the tester and try your </a:t>
+            </a:r>
+            <a:r>
+              <a:rPr lang="en-US" dirty="0" smtClean="0"/>
+              <a:t>solution</a:t>
+            </a:r>
+          </a:p>
+          <a:p>
+            <a:pPr marL="0" indent="0">
+              <a:buNone/>
+            </a:pPr>
+            <a:r>
+              <a:rPr lang="en-US" dirty="0"/>
+              <a:t>http://scratch.mit.edu/projects/17624370</a:t>
             </a:r>
             <a:endParaRPr lang="en-US" dirty="0" smtClean="0"/>
           </a:p>
@@ -5595,21 +5599,8 @@
             </a:r>
             <a:r>
               <a:rPr lang="en-US" dirty="0" smtClean="0"/>
-              <a:t>… </a:t>
-            </a:r>
-            <a:r>
-              <a:rPr lang="en-US" dirty="0" smtClean="0"/>
-              <a:t>try to rewrite this to allow </a:t>
-            </a:r>
-            <a:r>
-              <a:rPr lang="en-US" dirty="0" smtClean="0"/>
-              <a:t>a user to enter the commands when the program is running</a:t>
-            </a:r>
-            <a:r>
-              <a:rPr lang="en-US" dirty="0" smtClean="0"/>
-              <a:t>!  </a:t>
-            </a:r>
-            <a:endParaRPr lang="en-US" dirty="0" smtClean="0"/>
+              <a:t>… try to rewrite this to allow a user to enter the commands when the program is running!  </a:t>
+            </a:r>
           </a:p>
           <a:p>
             <a:pPr marL="0" indent="0">
@@ -5641,7 +5632,6 @@
               <a:rPr lang="en-US" dirty="0" smtClean="0"/>
               <a:t> (a short introduction) </a:t>
             </a:r>
-            <a:endParaRPr lang="en-US" dirty="0" smtClean="0"/>
           </a:p>
           <a:p>
             <a:pPr marL="0" indent="0">
@@ -5655,15 +5645,7 @@
             </a:pPr>
             <a:r>
               <a:rPr lang="en-US" dirty="0" smtClean="0"/>
-              <a:t>Second chat:  </a:t>
-            </a:r>
-            <a:r>
-              <a:rPr lang="en-US" dirty="0" smtClean="0"/>
-              <a:t>Change </a:t>
-            </a:r>
-            <a:r>
-              <a:rPr lang="en-US" dirty="0" smtClean="0"/>
-              <a:t>the validator to do a more advanced way of creating the grid </a:t>
+              <a:t>Second chat:  Change the validator to do a more advanced way of creating the grid </a:t>
             </a:r>
             <a:r>
               <a:rPr lang="en-US" sz="2600" b="1" dirty="0" smtClean="0"/>
@@ -5691,28 +5673,20 @@
             </a:r>
             <a:r>
               <a:rPr lang="en-US" dirty="0" smtClean="0"/>
-              <a:t> </a:t>
-            </a:r>
+              <a:t> Lego Creator</a:t>
+            </a:r>
+            <a:endParaRPr lang="en-US" dirty="0"/>
+          </a:p>
+          <a:p>
+            <a:endParaRPr lang="en-US" dirty="0"/>
+          </a:p>
+          <a:p>
+            <a:pPr marL="0" indent="0">
+              <a:buNone/>
+            </a:pPr>
             <a:r>
               <a:rPr lang="en-US" dirty="0" smtClean="0"/>
-              <a:t>Lego Creator</a:t>
-            </a:r>
-            <a:endParaRPr lang="en-US" dirty="0"/>
-          </a:p>
-          <a:p>
-            <a:endParaRPr lang="en-US" dirty="0"/>
-          </a:p>
-          <a:p>
-            <a:pPr marL="0" indent="0">
-              <a:buNone/>
-            </a:pPr>
-            <a:r>
-              <a:rPr lang="en-US" dirty="0" smtClean="0"/>
-              <a:t>Finally: </a:t>
-            </a:r>
-            <a:r>
-              <a:rPr lang="en-US" dirty="0" smtClean="0"/>
-              <a:t>Show your project!</a:t>
+              <a:t>Finally: Show your project!</a:t>
             </a:r>
           </a:p>
           <a:p>
@@ -5885,91 +5859,6 @@
                                   </p:childTnLst>
                                 </p:cTn>
                               </p:par>
-                              <p:par>
-                                <p:cTn id="12" presetID="2" presetClass="entr" presetSubtype="4" fill="hold" grpId="0" nodeType="withEffect">
-                                  <p:stCondLst>
-                                    <p:cond delay="0"/>
-                                  </p:stCondLst>
-                                  <p:childTnLst>
-                                    <p:set>
-                                      <p:cBhvr>
-                                        <p:cTn id="13" dur="1" fill="hold">
-                                          <p:stCondLst>
-                                            <p:cond delay="0"/>
-                                          </p:stCondLst>
-                                        </p:cTn>
-                                        <p:tgtEl>
-                                          <p:spTgt spid="3">
-                                            <p:txEl>
-                                              <p:pRg st="2" end="2"/>
-                                            </p:txEl>
-                                          </p:spTgt>
-                                        </p:tgtEl>
-                                        <p:attrNameLst>
-                                          <p:attrName>style.visibility</p:attrName>
-                                        </p:attrNameLst>
-                                      </p:cBhvr>
-                                      <p:to>
-                                        <p:strVal val="visible"/>
-                                      </p:to>
-                                    </p:set>
-                                    <p:anim calcmode="lin" valueType="num">
-                                      <p:cBhvr additive="base">
-                                        <p:cTn id="14" dur="500" fill="hold"/>
-                                        <p:tgtEl>
-                                          <p:spTgt spid="3">
-                                            <p:txEl>
-                                              <p:pRg st="2" end="2"/>
-                                            </p:txEl>
-                                          </p:spTgt>
-                                        </p:tgtEl>
-                                        <p:attrNameLst>
-                                          <p:attrName>ppt_x</p:attrName>
-                                        </p:attrNameLst>
-                                      </p:cBhvr>
-                                      <p:tavLst>
-                                        <p:tav tm="0">
-                                          <p:val>
-                                            <p:strVal val="#ppt_x"/>
-                                          </p:val>
-                                        </p:tav>
-                                        <p:tav tm="100000">
-                                          <p:val>
-                                            <p:strVal val="#ppt_x"/>
-                                          </p:val>
-                                        </p:tav>
-                                      </p:tavLst>
-                                    </p:anim>
-                                    <p:anim calcmode="lin" valueType="num">
-                                      <p:cBhvr additive="base">
-                                        <p:cTn id="15" dur="500" fill="hold"/>
-                                        <p:tgtEl>
-                                          <p:spTgt spid="3">
-                                            <p:txEl>
-                                              <p:pRg st="2" end="2"/>
-                                            </p:txEl>
-                                          </p:spTgt>
-                                        </p:tgtEl>
-                                        <p:attrNameLst>
-                                          <p:attrName>ppt_y</p:attrName>
-                                        </p:attrNameLst>
-                                      </p:cBhvr>
-                                      <p:tavLst>
-                                        <p:tav tm="0">
-                                          <p:val>
-                                            <p:strVal val="1+#ppt_h/2"/>
-                                          </p:val>
-                                        </p:tav>
-                                        <p:tav tm="100000">
-                                          <p:val>
-                                            <p:strVal val="#ppt_y"/>
-                                          </p:val>
-                                        </p:tav>
-                                      </p:tavLst>
-                                    </p:anim>
-                                  </p:childTnLst>
-                                </p:cTn>
-                              </p:par>
                             </p:childTnLst>
                           </p:cTn>
                         </p:par>
@@ -5977,19 +5866,104 @@
                     </p:cTn>
                   </p:par>
                   <p:par>
-                    <p:cTn id="16" fill="hold">
+                    <p:cTn id="12" fill="hold">
                       <p:stCondLst>
                         <p:cond delay="indefinite"/>
                       </p:stCondLst>
                       <p:childTnLst>
                         <p:par>
-                          <p:cTn id="17" fill="hold">
+                          <p:cTn id="13" fill="hold">
                             <p:stCondLst>
                               <p:cond delay="0"/>
                             </p:stCondLst>
                             <p:childTnLst>
                               <p:par>
-                                <p:cTn id="18" presetID="2" presetClass="entr" presetSubtype="4" fill="hold" grpId="0" nodeType="clickEffect">
+                                <p:cTn id="14" presetID="2" presetClass="entr" presetSubtype="4" fill="hold" grpId="0" nodeType="clickEffect">
+                                  <p:stCondLst>
+                                    <p:cond delay="0"/>
+                                  </p:stCondLst>
+                                  <p:childTnLst>
+                                    <p:set>
+                                      <p:cBhvr>
+                                        <p:cTn id="15" dur="1" fill="hold">
+                                          <p:stCondLst>
+                                            <p:cond delay="0"/>
+                                          </p:stCondLst>
+                                        </p:cTn>
+                                        <p:tgtEl>
+                                          <p:spTgt spid="3">
+                                            <p:txEl>
+                                              <p:pRg st="1" end="1"/>
+                                            </p:txEl>
+                                          </p:spTgt>
+                                        </p:tgtEl>
+                                        <p:attrNameLst>
+                                          <p:attrName>style.visibility</p:attrName>
+                                        </p:attrNameLst>
+                                      </p:cBhvr>
+                                      <p:to>
+                                        <p:strVal val="visible"/>
+                                      </p:to>
+                                    </p:set>
+                                    <p:anim calcmode="lin" valueType="num">
+                                      <p:cBhvr additive="base">
+                                        <p:cTn id="16" dur="500" fill="hold"/>
+                                        <p:tgtEl>
+                                          <p:spTgt spid="3">
+                                            <p:txEl>
+                                              <p:pRg st="1" end="1"/>
+                                            </p:txEl>
+                                          </p:spTgt>
+                                        </p:tgtEl>
+                                        <p:attrNameLst>
+                                          <p:attrName>ppt_x</p:attrName>
+                                        </p:attrNameLst>
+                                      </p:cBhvr>
+                                      <p:tavLst>
+                                        <p:tav tm="0">
+                                          <p:val>
+                                            <p:strVal val="#ppt_x"/>
+                                          </p:val>
+                                        </p:tav>
+                                        <p:tav tm="100000">
+                                          <p:val>
+                                            <p:strVal val="#ppt_x"/>
+                                          </p:val>
+                                        </p:tav>
+                                      </p:tavLst>
+                                    </p:anim>
+                                    <p:anim calcmode="lin" valueType="num">
+                                      <p:cBhvr additive="base">
+                                        <p:cTn id="17" dur="500" fill="hold"/>
+                                        <p:tgtEl>
+                                          <p:spTgt spid="3">
+                                            <p:txEl>
+                                              <p:pRg st="1" end="1"/>
+                                            </p:txEl>
+                                          </p:spTgt>
+                                        </p:tgtEl>
+                                        <p:attrNameLst>
+                                          <p:attrName>ppt_y</p:attrName>
+                                        </p:attrNameLst>
+                                      </p:cBhvr>
+                                      <p:tavLst>
+                                        <p:tav tm="0">
+                                          <p:val>
+                                            <p:strVal val="1+#ppt_h/2"/>
+                                          </p:val>
+                                        </p:tav>
+                                        <p:tav tm="100000">
+                                          <p:val>
+                                            <p:strVal val="#ppt_y"/>
+                                          </p:val>
+                                        </p:tav>
+                                      </p:tavLst>
+                                    </p:anim>
+                                  </p:childTnLst>
+                                </p:cTn>
+                              </p:par>
+                              <p:par>
+                                <p:cTn id="18" presetID="2" presetClass="entr" presetSubtype="4" fill="hold" grpId="0" nodeType="withEffect">
                                   <p:stCondLst>
                                     <p:cond delay="0"/>
                                   </p:stCondLst>
@@ -6004,7 +5978,7 @@
                                         <p:tgtEl>
                                           <p:spTgt spid="3">
                                             <p:txEl>
-                                              <p:pRg st="4" end="4"/>
+                                              <p:pRg st="3" end="3"/>
                                             </p:txEl>
                                           </p:spTgt>
                                         </p:tgtEl>
@@ -6022,7 +5996,7 @@
                                         <p:tgtEl>
                                           <p:spTgt spid="3">
                                             <p:txEl>
-                                              <p:pRg st="4" end="4"/>
+                                              <p:pRg st="3" end="3"/>
                                             </p:txEl>
                                           </p:spTgt>
                                         </p:tgtEl>
@@ -6049,7 +6023,7 @@
                                         <p:tgtEl>
                                           <p:spTgt spid="3">
                                             <p:txEl>
-                                              <p:pRg st="4" end="4"/>
+                                              <p:pRg st="3" end="3"/>
                                             </p:txEl>
                                           </p:spTgt>
                                         </p:tgtEl>
@@ -6107,7 +6081,7 @@
                                         <p:tgtEl>
                                           <p:spTgt spid="3">
                                             <p:txEl>
-                                              <p:pRg st="6" end="6"/>
+                                              <p:pRg st="5" end="5"/>
                                             </p:txEl>
                                           </p:spTgt>
                                         </p:tgtEl>
@@ -6125,7 +6099,7 @@
                                         <p:tgtEl>
                                           <p:spTgt spid="3">
                                             <p:txEl>
-                                              <p:pRg st="6" end="6"/>
+                                              <p:pRg st="5" end="5"/>
                                             </p:txEl>
                                           </p:spTgt>
                                         </p:tgtEl>
@@ -6152,7 +6126,7 @@
                                         <p:tgtEl>
                                           <p:spTgt spid="3">
                                             <p:txEl>
-                                              <p:pRg st="6" end="6"/>
+                                              <p:pRg st="5" end="5"/>
                                             </p:txEl>
                                           </p:spTgt>
                                         </p:tgtEl>
@@ -6210,7 +6184,7 @@
                                         <p:tgtEl>
                                           <p:spTgt spid="3">
                                             <p:txEl>
-                                              <p:pRg st="8" end="8"/>
+                                              <p:pRg st="7" end="7"/>
                                             </p:txEl>
                                           </p:spTgt>
                                         </p:tgtEl>
@@ -6228,7 +6202,7 @@
                                         <p:tgtEl>
                                           <p:spTgt spid="3">
                                             <p:txEl>
-                                              <p:pRg st="8" end="8"/>
+                                              <p:pRg st="7" end="7"/>
                                             </p:txEl>
                                           </p:spTgt>
                                         </p:tgtEl>
@@ -6255,7 +6229,110 @@
                                         <p:tgtEl>
                                           <p:spTgt spid="3">
                                             <p:txEl>
-                                              <p:pRg st="8" end="8"/>
+                                              <p:pRg st="7" end="7"/>
+                                            </p:txEl>
+                                          </p:spTgt>
+                                        </p:tgtEl>
+                                        <p:attrNameLst>
+                                          <p:attrName>ppt_y</p:attrName>
+                                        </p:attrNameLst>
+                                      </p:cBhvr>
+                                      <p:tavLst>
+                                        <p:tav tm="0">
+                                          <p:val>
+                                            <p:strVal val="1+#ppt_h/2"/>
+                                          </p:val>
+                                        </p:tav>
+                                        <p:tav tm="100000">
+                                          <p:val>
+                                            <p:strVal val="#ppt_y"/>
+                                          </p:val>
+                                        </p:tav>
+                                      </p:tavLst>
+                                    </p:anim>
+                                  </p:childTnLst>
+                                </p:cTn>
+                              </p:par>
+                            </p:childTnLst>
+                          </p:cTn>
+                        </p:par>
+                      </p:childTnLst>
+                    </p:cTn>
+                  </p:par>
+                  <p:par>
+                    <p:cTn id="34" fill="hold">
+                      <p:stCondLst>
+                        <p:cond delay="indefinite"/>
+                      </p:stCondLst>
+                      <p:childTnLst>
+                        <p:par>
+                          <p:cTn id="35" fill="hold">
+                            <p:stCondLst>
+                              <p:cond delay="0"/>
+                            </p:stCondLst>
+                            <p:childTnLst>
+                              <p:par>
+                                <p:cTn id="36" presetID="2" presetClass="entr" presetSubtype="4" fill="hold" grpId="0" nodeType="clickEffect">
+                                  <p:stCondLst>
+                                    <p:cond delay="0"/>
+                                  </p:stCondLst>
+                                  <p:childTnLst>
+                                    <p:set>
+                                      <p:cBhvr>
+                                        <p:cTn id="37" dur="1" fill="hold">
+                                          <p:stCondLst>
+                                            <p:cond delay="0"/>
+                                          </p:stCondLst>
+                                        </p:cTn>
+                                        <p:tgtEl>
+                                          <p:spTgt spid="3">
+                                            <p:txEl>
+                                              <p:pRg st="9" end="9"/>
+                                            </p:txEl>
+                                          </p:spTgt>
+                                        </p:tgtEl>
+                                        <p:attrNameLst>
+                                          <p:attrName>style.visibility</p:attrName>
+                                        </p:attrNameLst>
+                                      </p:cBhvr>
+                                      <p:to>
+                                        <p:strVal val="visible"/>
+                                      </p:to>
+                                    </p:set>
+                                    <p:anim calcmode="lin" valueType="num">
+                                      <p:cBhvr additive="base">
+                                        <p:cTn id="38" dur="500" fill="hold"/>
+                                        <p:tgtEl>
+                                          <p:spTgt spid="3">
+                                            <p:txEl>
+                                              <p:pRg st="9" end="9"/>
+                                            </p:txEl>
+                                          </p:spTgt>
+                                        </p:tgtEl>
+                                        <p:attrNameLst>
+                                          <p:attrName>ppt_x</p:attrName>
+                                        </p:attrNameLst>
+                                      </p:cBhvr>
+                                      <p:tavLst>
+                                        <p:tav tm="0">
+                                          <p:val>
+                                            <p:strVal val="#ppt_x"/>
+                                          </p:val>
+                                        </p:tav>
+                                        <p:tav tm="100000">
+                                          <p:val>
+                                            <p:strVal val="#ppt_x"/>
+                                          </p:val>
+                                        </p:tav>
+                                      </p:tavLst>
+                                    </p:anim>
+                                    <p:anim calcmode="lin" valueType="num">
+                                      <p:cBhvr additive="base">
+                                        <p:cTn id="39" dur="500" fill="hold"/>
+                                        <p:tgtEl>
+                                          <p:spTgt spid="3">
+                                            <p:txEl>
+                                              <p:pRg st="9" end="9"/>
                                             </p:txEl>
                                           </p:spTgt>
                                         </p:tgtEl>
@@ -6280,14 +6357,14 @@
                                 </p:cTn>
                               </p:par>
                               <p:par>
-                                <p:cTn id="34" presetID="2" presetClass="entr" presetSubtype="4" fill="hold" grpId="0" nodeType="withEffect">
+                                <p:cTn id="40" presetID="2" presetClass="entr" presetSubtype="4" fill="hold" grpId="0" nodeType="withEffect">
                                   <p:stCondLst>
                                     <p:cond delay="0"/>
                                   </p:stCondLst>
                                   <p:childTnLst>
                                     <p:set>
                                       <p:cBhvr>
-                                        <p:cTn id="35" dur="1" fill="hold">
+                                        <p:cTn id="41" dur="1" fill="hold">
                                           <p:stCondLst>
                                             <p:cond delay="0"/>
                                           </p:stCondLst>
@@ -6295,7 +6372,7 @@
                                         <p:tgtEl>
                                           <p:spTgt spid="3">
                                             <p:txEl>
-                                              <p:pRg st="10" end="10"/>
+                                              <p:pRg st="11" end="11"/>
                                             </p:txEl>
                                           </p:spTgt>
                                         </p:tgtEl>
@@ -6309,11 +6386,11 @@
                                     </p:set>
                                     <p:anim calcmode="lin" valueType="num">
                                       <p:cBhvr additive="base">
-                                        <p:cTn id="36" dur="500" fill="hold"/>
-                                        <p:tgtEl>
-                                          <p:spTgt spid="3">
-                                            <p:txEl>
-                                              <p:pRg st="10" end="10"/>
+                                        <p:cTn id="42" dur="500" fill="hold"/>
+                                        <p:tgtEl>
+                                          <p:spTgt spid="3">
+                                            <p:txEl>
+                                              <p:pRg st="11" end="11"/>
                                             </p:txEl>
                                           </p:spTgt>
                                         </p:tgtEl>
@@ -6336,11 +6413,11 @@
                                     </p:anim>
                                     <p:anim calcmode="lin" valueType="num">
                                       <p:cBhvr additive="base">
-                                        <p:cTn id="37" dur="500" fill="hold"/>
-                                        <p:tgtEl>
-                                          <p:spTgt spid="3">
-                                            <p:txEl>
-                                              <p:pRg st="10" end="10"/>
+                                        <p:cTn id="43" dur="500" fill="hold"/>
+                                        <p:tgtEl>
+                                          <p:spTgt spid="3">
+                                            <p:txEl>
+                                              <p:pRg st="11" end="11"/>
                                             </p:txEl>
                                           </p:spTgt>
                                         </p:tgtEl>
@@ -6435,11 +6512,7 @@
           <a:p>
             <a:r>
               <a:rPr lang="en-US" sz="4400" dirty="0" smtClean="0"/>
-              <a:t>Let’s use a program to </a:t>
-            </a:r>
-            <a:r>
-              <a:rPr lang="en-US" sz="4400" dirty="0" smtClean="0"/>
-              <a:t>test</a:t>
+              <a:t>Let’s use a program to test</a:t>
             </a:r>
             <a:br>
               <a:rPr lang="en-US" sz="4400" dirty="0" smtClean="0"/>
@@ -6507,33 +6580,13 @@
           <a:p>
             <a:r>
               <a:rPr lang="en-US" dirty="0" smtClean="0"/>
-              <a:t>Did you know you can add </a:t>
-            </a:r>
+              <a:t>Did you know you can add your very own blocks to your program?  Why?</a:t>
+            </a:r>
+          </a:p>
+          <a:p>
             <a:r>
               <a:rPr lang="en-US" dirty="0" smtClean="0"/>
-              <a:t>your very own blocks </a:t>
-            </a:r>
-            <a:r>
-              <a:rPr lang="en-US" dirty="0" smtClean="0"/>
-              <a:t>to your </a:t>
-            </a:r>
-            <a:r>
-              <a:rPr lang="en-US" dirty="0" smtClean="0"/>
-              <a:t>program?  Why?</a:t>
-            </a:r>
-          </a:p>
-          <a:p>
-            <a:r>
-              <a:rPr lang="en-US" dirty="0" smtClean="0"/>
-              <a:t>Good for factoring </a:t>
-            </a:r>
-            <a:r>
-              <a:rPr lang="en-US" dirty="0" smtClean="0"/>
-              <a:t>out common chunks of code, or to make a complicated section more </a:t>
-            </a:r>
-            <a:r>
-              <a:rPr lang="en-US" dirty="0" smtClean="0"/>
-              <a:t>understandable </a:t>
+              <a:t>Good for factoring out common chunks of code, or to make a complicated section more understandable </a:t>
             </a:r>
             <a:endParaRPr lang="en-US" dirty="0"/>
           </a:p>
@@ -6551,50 +6604,13 @@
           <a:p>
             <a:r>
               <a:rPr lang="en-US" dirty="0" smtClean="0"/>
-              <a:t>Drag blocks that you or your partner </a:t>
-            </a:r>
+              <a:t>Drag blocks that you or your partner wrote and test it</a:t>
+            </a:r>
+          </a:p>
+          <a:p>
             <a:r>
               <a:rPr lang="en-US" dirty="0" smtClean="0"/>
-              <a:t>wrote and test it</a:t>
-            </a:r>
-            <a:endParaRPr lang="en-US" dirty="0" smtClean="0"/>
-          </a:p>
-          <a:p>
-            <a:r>
-              <a:rPr lang="en-US" dirty="0" smtClean="0"/>
-              <a:t>To </a:t>
-            </a:r>
-            <a:r>
-              <a:rPr lang="en-US" dirty="0" smtClean="0"/>
-              <a:t>validate via More Blocks, </a:t>
-            </a:r>
-            <a:r>
-              <a:rPr lang="en-US" dirty="0" smtClean="0"/>
-              <a:t>set the size, then </a:t>
-            </a:r>
-            <a:r>
-              <a:rPr lang="en-US" dirty="0" smtClean="0"/>
-              <a:t>(Paint Grid), </a:t>
-            </a:r>
-            <a:r>
-              <a:rPr lang="en-US" dirty="0" smtClean="0"/>
-              <a:t>then </a:t>
-            </a:r>
-            <a:r>
-              <a:rPr lang="en-US" dirty="0" smtClean="0"/>
-              <a:t>double-click </a:t>
-            </a:r>
-            <a:r>
-              <a:rPr lang="en-US" dirty="0" smtClean="0"/>
-              <a:t>the </a:t>
-            </a:r>
-            <a:r>
-              <a:rPr lang="en-US" dirty="0" smtClean="0"/>
-              <a:t>command list </a:t>
-            </a:r>
-            <a:r>
-              <a:rPr lang="en-US" dirty="0" smtClean="0"/>
-              <a:t>you put in.</a:t>
+              <a:t>To validate via More Blocks, set the size, then (Paint Grid), then double-click the command list you put in.</a:t>
             </a:r>
           </a:p>
           <a:p>
@@ -7911,11 +7927,7 @@
           <a:p>
             <a:r>
               <a:rPr lang="en-US" sz="4400" b="1" dirty="0" smtClean="0"/>
-              <a:t>Lists are </a:t>
-            </a:r>
-            <a:r>
-              <a:rPr lang="en-US" sz="4400" b="1" dirty="0" smtClean="0"/>
-              <a:t>for storing data</a:t>
+              <a:t>Lists are for storing data</a:t>
             </a:r>
             <a:endParaRPr lang="en-US" sz="4400" b="1" dirty="0"/>
           </a:p>
@@ -7945,15 +7957,7 @@
           <a:p>
             <a:r>
               <a:rPr lang="en-US" sz="2800" dirty="0" smtClean="0"/>
-              <a:t>You can make a list of </a:t>
-            </a:r>
-            <a:r>
-              <a:rPr lang="en-US" sz="2800" dirty="0" smtClean="0"/>
-              <a:t>constant data</a:t>
-            </a:r>
-            <a:r>
-              <a:rPr lang="en-US" sz="2800" dirty="0" smtClean="0"/>
-              <a:t>.  </a:t>
+              <a:t>You can make a list of constant data.  </a:t>
             </a:r>
           </a:p>
           <a:p>
@@ -7968,21 +7972,8 @@
           <a:p>
             <a:r>
               <a:rPr lang="en-US" sz="2800" dirty="0" smtClean="0"/>
-              <a:t>You can gather a user’s </a:t>
-            </a:r>
-            <a:r>
-              <a:rPr lang="en-US" sz="2800" dirty="0" smtClean="0"/>
-              <a:t>actions </a:t>
-            </a:r>
-            <a:r>
-              <a:rPr lang="en-US" sz="2800" dirty="0" smtClean="0"/>
-              <a:t>for </a:t>
-            </a:r>
-            <a:r>
-              <a:rPr lang="en-US" sz="2800" dirty="0" smtClean="0"/>
-              <a:t>history or to use later</a:t>
-            </a:r>
-            <a:endParaRPr lang="en-US" sz="2800" dirty="0" smtClean="0"/>
+              <a:t>You can gather a user’s actions for history or to use later</a:t>
+            </a:r>
           </a:p>
           <a:p>
             <a:r>
@@ -8268,15 +8259,7 @@
           <a:p>
             <a:r>
               <a:rPr lang="en-US" dirty="0" smtClean="0"/>
-              <a:t>What are the ‘standard colors’?  Here’s </a:t>
-            </a:r>
-            <a:r>
-              <a:rPr lang="en-US" dirty="0" smtClean="0"/>
-              <a:t>my list</a:t>
-            </a:r>
-            <a:r>
-              <a:rPr lang="en-US" dirty="0" smtClean="0"/>
-              <a:t>….</a:t>
+              <a:t>What are the ‘standard colors’?  Here’s my list….</a:t>
             </a:r>
           </a:p>
           <a:p>
@@ -8331,21 +8314,8 @@
                   <a:srgbClr val="7030A0"/>
                 </a:solidFill>
               </a:rPr>
-              <a:t>’ which looped thru </a:t>
-            </a:r>
-            <a:r>
-              <a:rPr lang="en-US" sz="2600" dirty="0" smtClean="0">
-                <a:solidFill>
-                  <a:srgbClr val="7030A0"/>
-                </a:solidFill>
-              </a:rPr>
-              <a:t>(on press of ‘c’)</a:t>
-            </a:r>
-            <a:endParaRPr lang="en-US" sz="2600" dirty="0" smtClean="0">
-              <a:solidFill>
-                <a:srgbClr val="7030A0"/>
-              </a:solidFill>
-            </a:endParaRPr>
+              <a:t>’ which looped thru (on press of ‘c’)</a:t>
+            </a:r>
           </a:p>
           <a:p>
             <a:endParaRPr lang="en-US" sz="2600" dirty="0">
@@ -10524,17 +10494,13 @@
         <p:spPr/>
         <p:txBody>
           <a:bodyPr>
-            <a:normAutofit/>
+            <a:normAutofit fontScale="90000"/>
           </a:bodyPr>
           <a:lstStyle/>
           <a:p>
             <a:r>
               <a:rPr lang="en-US" dirty="0" smtClean="0"/>
               <a:t>If you want a challenge</a:t>
-            </a:r>
-            <a:r>
-              <a:rPr lang="en-US" dirty="0" smtClean="0"/>
-              <a:t/>
             </a:r>
             <a:br>
               <a:rPr lang="en-US" dirty="0" smtClean="0"/>
@@ -10544,8 +10510,15 @@
               <a:t>Improve the </a:t>
             </a:r>
             <a:r>
-              <a:rPr lang="en-US" dirty="0" smtClean="0"/>
-              <a:t>code</a:t>
+              <a:rPr lang="en-US" dirty="0"/>
+              <a:t>code in </a:t>
+            </a:r>
+            <a:br>
+              <a:rPr lang="en-US" dirty="0"/>
+            </a:br>
+            <a:r>
+              <a:rPr lang="en-US" dirty="0"/>
+              <a:t>http://scratch.mit.edu/projects/17624370/</a:t>
             </a:r>
             <a:endParaRPr lang="en-US" sz="3600" b="1" dirty="0"/>
           </a:p>
@@ -10569,60 +10542,26 @@
         </p:spPr>
         <p:txBody>
           <a:bodyPr>
-            <a:normAutofit/>
+            <a:normAutofit fontScale="92500"/>
           </a:bodyPr>
           <a:lstStyle/>
           <a:p>
             <a:r>
               <a:rPr lang="en-US" sz="2400" dirty="0" smtClean="0"/>
-              <a:t>You can use the arrow keys to go way outside of the painted </a:t>
-            </a:r>
+              <a:t>You can use the arrow keys to go way outside of the painted grid.  You might be able to fix this quickly.</a:t>
+            </a:r>
+          </a:p>
+          <a:p>
             <a:r>
               <a:rPr lang="en-US" sz="2400" dirty="0" smtClean="0"/>
-              <a:t>grid.  You might </a:t>
-            </a:r>
+              <a:t>You can’t clear and start over.  (add a new feature)</a:t>
+            </a:r>
+          </a:p>
+          <a:p>
             <a:r>
               <a:rPr lang="en-US" sz="2400" dirty="0" smtClean="0"/>
-              <a:t>be able to fix this </a:t>
-            </a:r>
-            <a:r>
-              <a:rPr lang="en-US" sz="2400" dirty="0" smtClean="0"/>
-              <a:t>quickly.</a:t>
-            </a:r>
-            <a:endParaRPr lang="en-US" sz="2400" dirty="0" smtClean="0"/>
-          </a:p>
-          <a:p>
-            <a:r>
-              <a:rPr lang="en-US" sz="2400" dirty="0" smtClean="0"/>
-              <a:t>You can’t clear and start over.  </a:t>
-            </a:r>
-            <a:r>
-              <a:rPr lang="en-US" sz="2400" dirty="0" smtClean="0"/>
-              <a:t>(add a new </a:t>
-            </a:r>
-            <a:r>
-              <a:rPr lang="en-US" sz="2400" dirty="0" smtClean="0"/>
-              <a:t>feature)</a:t>
-            </a:r>
-          </a:p>
-          <a:p>
-            <a:r>
-              <a:rPr lang="en-US" sz="2400" dirty="0" smtClean="0"/>
-              <a:t>(this is just </a:t>
-            </a:r>
-            <a:r>
-              <a:rPr lang="en-US" sz="2400" dirty="0" smtClean="0"/>
-              <a:t>a </a:t>
-            </a:r>
-            <a:r>
-              <a:rPr lang="en-US" sz="2400" dirty="0" smtClean="0"/>
-              <a:t>minor defect) </a:t>
-            </a:r>
-            <a:r>
-              <a:rPr lang="en-US" sz="2400" dirty="0" smtClean="0"/>
-              <a:t>The cursor sometimes changes the ‘white’ color, not the fill.    </a:t>
-            </a:r>
-            <a:endParaRPr lang="en-US" sz="2400" dirty="0" smtClean="0"/>
+              <a:t>(this is just a minor defect) The cursor sometimes changes the ‘white’ color, not the fill.    </a:t>
+            </a:r>
           </a:p>
           <a:p>
             <a:endParaRPr lang="en-US" sz="2400" dirty="0" smtClean="0"/>
@@ -10636,8 +10575,40 @@
           <a:p>
             <a:r>
               <a:rPr lang="en-US" sz="2400" dirty="0" smtClean="0"/>
-              <a:t>Advanced kids who didn’t take on the earlier challenge could refactor the cursor from the ‘fill’ square and eliminate all the tests that forbid the code from running on clones.</a:t>
-            </a:r>
+              <a:t>Advanced kids who didn’t take on the earlier challenge could refactor the cursor from the ‘fill’ square and eliminate all the tests that forbid the code from running on clones</a:t>
+            </a:r>
+            <a:r>
+              <a:rPr lang="en-US" sz="2400" dirty="0" smtClean="0"/>
+              <a:t>.</a:t>
+            </a:r>
+          </a:p>
+          <a:p>
+            <a:r>
+              <a:rPr lang="en-US" sz="2400" dirty="0" smtClean="0"/>
+              <a:t>If you just want to see my list and clone code, look at </a:t>
+            </a:r>
+          </a:p>
+          <a:p>
+            <a:pPr marL="0" indent="0">
+              <a:buNone/>
+            </a:pPr>
+            <a:r>
+              <a:rPr lang="en-US" sz="2400" smtClean="0"/>
+              <a:t>	http</a:t>
+            </a:r>
+            <a:r>
+              <a:rPr lang="en-US" sz="2400"/>
+              <a:t>://scratch.mit.edu/projects/18081278</a:t>
+            </a:r>
+          </a:p>
+          <a:p>
+            <a:endParaRPr lang="en-US" sz="2400" dirty="0" smtClean="0"/>
+          </a:p>
+          <a:p>
+            <a:pPr marL="0" indent="0">
+              <a:buNone/>
+            </a:pPr>
+            <a:endParaRPr lang="en-US" sz="2400" dirty="0" smtClean="0"/>
           </a:p>
         </p:txBody>
       </p:sp>
@@ -11217,6 +11188,236 @@
                                           <p:spTgt spid="3">
                                             <p:txEl>
                                               <p:pRg st="5" end="5"/>
+                                            </p:txEl>
+                                          </p:spTgt>
+                                        </p:tgtEl>
+                                        <p:attrNameLst>
+                                          <p:attrName>ppt_y</p:attrName>
+                                        </p:attrNameLst>
+                                      </p:cBhvr>
+                                      <p:tavLst>
+                                        <p:tav tm="0">
+                                          <p:val>
+                                            <p:strVal val="#ppt_y+.1"/>
+                                          </p:val>
+                                        </p:tav>
+                                        <p:tav tm="100000">
+                                          <p:val>
+                                            <p:strVal val="#ppt_y"/>
+                                          </p:val>
+                                        </p:tav>
+                                      </p:tavLst>
+                                    </p:anim>
+                                  </p:childTnLst>
+                                </p:cTn>
+                              </p:par>
+                            </p:childTnLst>
+                          </p:cTn>
+                        </p:par>
+                      </p:childTnLst>
+                    </p:cTn>
+                  </p:par>
+                  <p:par>
+                    <p:cTn id="38" fill="hold">
+                      <p:stCondLst>
+                        <p:cond delay="indefinite"/>
+                      </p:stCondLst>
+                      <p:childTnLst>
+                        <p:par>
+                          <p:cTn id="39" fill="hold">
+                            <p:stCondLst>
+                              <p:cond delay="0"/>
+                            </p:stCondLst>
+                            <p:childTnLst>
+                              <p:par>
+                                <p:cTn id="40" presetID="42" presetClass="entr" presetSubtype="0" fill="hold" grpId="0" nodeType="clickEffect">
+                                  <p:stCondLst>
+                                    <p:cond delay="0"/>
+                                  </p:stCondLst>
+                                  <p:childTnLst>
+                                    <p:set>
+                                      <p:cBhvr>
+                                        <p:cTn id="41" dur="1" fill="hold">
+                                          <p:stCondLst>
+                                            <p:cond delay="0"/>
+                                          </p:stCondLst>
+                                        </p:cTn>
+                                        <p:tgtEl>
+                                          <p:spTgt spid="3">
+                                            <p:txEl>
+                                              <p:pRg st="6" end="6"/>
+                                            </p:txEl>
+                                          </p:spTgt>
+                                        </p:tgtEl>
+                                        <p:attrNameLst>
+                                          <p:attrName>style.visibility</p:attrName>
+                                        </p:attrNameLst>
+                                      </p:cBhvr>
+                                      <p:to>
+                                        <p:strVal val="visible"/>
+                                      </p:to>
+                                    </p:set>
+                                    <p:animEffect transition="in" filter="fade">
+                                      <p:cBhvr>
+                                        <p:cTn id="42" dur="1000"/>
+                                        <p:tgtEl>
+                                          <p:spTgt spid="3">
+                                            <p:txEl>
+                                              <p:pRg st="6" end="6"/>
+                                            </p:txEl>
+                                          </p:spTgt>
+                                        </p:tgtEl>
+                                      </p:cBhvr>
+                                    </p:animEffect>
+                                    <p:anim calcmode="lin" valueType="num">
+                                      <p:cBhvr>
+                                        <p:cTn id="43" dur="1000" fill="hold"/>
+                                        <p:tgtEl>
+                                          <p:spTgt spid="3">
+                                            <p:txEl>
+                                              <p:pRg st="6" end="6"/>
+                                            </p:txEl>
+                                          </p:spTgt>
+                                        </p:tgtEl>
+                                        <p:attrNameLst>
+                                          <p:attrName>ppt_x</p:attrName>
+                                        </p:attrNameLst>
+                                      </p:cBhvr>
+                                      <p:tavLst>
+                                        <p:tav tm="0">
+                                          <p:val>
+                                            <p:strVal val="#ppt_x"/>
+                                          </p:val>
+                                        </p:tav>
+                                        <p:tav tm="100000">
+                                          <p:val>
+                                            <p:strVal val="#ppt_x"/>
+                                          </p:val>
+                                        </p:tav>
+                                      </p:tavLst>
+                                    </p:anim>
+                                    <p:anim calcmode="lin" valueType="num">
+                                      <p:cBhvr>
+                                        <p:cTn id="44" dur="1000" fill="hold"/>
+                                        <p:tgtEl>
+                                          <p:spTgt spid="3">
+                                            <p:txEl>
+                                              <p:pRg st="6" end="6"/>
+                                            </p:txEl>
+                                          </p:spTgt>
+                                        </p:tgtEl>
+                                        <p:attrNameLst>
+                                          <p:attrName>ppt_y</p:attrName>
+                                        </p:attrNameLst>
+                                      </p:cBhvr>
+                                      <p:tavLst>
+                                        <p:tav tm="0">
+                                          <p:val>
+                                            <p:strVal val="#ppt_y+.1"/>
+                                          </p:val>
+                                        </p:tav>
+                                        <p:tav tm="100000">
+                                          <p:val>
+                                            <p:strVal val="#ppt_y"/>
+                                          </p:val>
+                                        </p:tav>
+                                      </p:tavLst>
+                                    </p:anim>
+                                  </p:childTnLst>
+                                </p:cTn>
+                              </p:par>
+                            </p:childTnLst>
+                          </p:cTn>
+                        </p:par>
+                      </p:childTnLst>
+                    </p:cTn>
+                  </p:par>
+                  <p:par>
+                    <p:cTn id="45" fill="hold">
+                      <p:stCondLst>
+                        <p:cond delay="indefinite"/>
+                      </p:stCondLst>
+                      <p:childTnLst>
+                        <p:par>
+                          <p:cTn id="46" fill="hold">
+                            <p:stCondLst>
+                              <p:cond delay="0"/>
+                            </p:stCondLst>
+                            <p:childTnLst>
+                              <p:par>
+                                <p:cTn id="47" presetID="42" presetClass="entr" presetSubtype="0" fill="hold" grpId="0" nodeType="clickEffect">
+                                  <p:stCondLst>
+                                    <p:cond delay="0"/>
+                                  </p:stCondLst>
+                                  <p:childTnLst>
+                                    <p:set>
+                                      <p:cBhvr>
+                                        <p:cTn id="48" dur="1" fill="hold">
+                                          <p:stCondLst>
+                                            <p:cond delay="0"/>
+                                          </p:stCondLst>
+                                        </p:cTn>
+                                        <p:tgtEl>
+                                          <p:spTgt spid="3">
+                                            <p:txEl>
+                                              <p:pRg st="7" end="7"/>
+                                            </p:txEl>
+                                          </p:spTgt>
+                                        </p:tgtEl>
+                                        <p:attrNameLst>
+                                          <p:attrName>style.visibility</p:attrName>
+                                        </p:attrNameLst>
+                                      </p:cBhvr>
+                                      <p:to>
+                                        <p:strVal val="visible"/>
+                                      </p:to>
+                                    </p:set>
+                                    <p:animEffect transition="in" filter="fade">
+                                      <p:cBhvr>
+                                        <p:cTn id="49" dur="1000"/>
+                                        <p:tgtEl>
+                                          <p:spTgt spid="3">
+                                            <p:txEl>
+                                              <p:pRg st="7" end="7"/>
+                                            </p:txEl>
+                                          </p:spTgt>
+                                        </p:tgtEl>
+                                      </p:cBhvr>
+                                    </p:animEffect>
+                                    <p:anim calcmode="lin" valueType="num">
+                                      <p:cBhvr>
+                                        <p:cTn id="50" dur="1000" fill="hold"/>
+                                        <p:tgtEl>
+                                          <p:spTgt spid="3">
+                                            <p:txEl>
+                                              <p:pRg st="7" end="7"/>
+                                            </p:txEl>
+                                          </p:spTgt>
+                                        </p:tgtEl>
+                                        <p:attrNameLst>
+                                          <p:attrName>ppt_x</p:attrName>
+                                        </p:attrNameLst>
+                                      </p:cBhvr>
+                                      <p:tavLst>
+                                        <p:tav tm="0">
+                                          <p:val>
+                                            <p:strVal val="#ppt_x"/>
+                                          </p:val>
+                                        </p:tav>
+                                        <p:tav tm="100000">
+                                          <p:val>
+                                            <p:strVal val="#ppt_x"/>
+                                          </p:val>
+                                        </p:tav>
+                                      </p:tavLst>
+                                    </p:anim>
+                                    <p:anim calcmode="lin" valueType="num">
+                                      <p:cBhvr>
+                                        <p:cTn id="51" dur="1000" fill="hold"/>
+                                        <p:tgtEl>
+                                          <p:spTgt spid="3">
+                                            <p:txEl>
+                                              <p:pRg st="7" end="7"/>
                                             </p:txEl>
                                           </p:spTgt>
                                         </p:tgtEl>
@@ -11529,7 +11730,7 @@
   <a:extraClrSchemeLst/>
   <a:extLst>
     <a:ext uri="{05A4C25C-085E-4340-85A3-A5531E510DB2}">
-      <thm15:themeFamily xmlns="" xmlns:thm15="http://schemas.microsoft.com/office/thememl/2012/main" name="Office Theme" id="{62F939B6-93AF-4DB8-9C6B-D6C7DFDC589F}" vid="{4A3C46E8-61CC-4603-A589-7422A47A8E4A}"/>
+      <thm15:themeFamily xmlns:thm15="http://schemas.microsoft.com/office/thememl/2012/main" xmlns="" name="Office Theme" id="{62F939B6-93AF-4DB8-9C6B-D6C7DFDC589F}" vid="{4A3C46E8-61CC-4603-A589-7422A47A8E4A}"/>
     </a:ext>
   </a:extLst>
 </a:theme>
@@ -11790,7 +11991,7 @@
   <a:extraClrSchemeLst/>
   <a:extLst>
     <a:ext uri="{05A4C25C-085E-4340-85A3-A5531E510DB2}">
-      <thm15:themeFamily xmlns="" xmlns:thm15="http://schemas.microsoft.com/office/thememl/2012/main" name="Office Theme" id="{62F939B6-93AF-4DB8-9C6B-D6C7DFDC589F}" vid="{4A3C46E8-61CC-4603-A589-7422A47A8E4A}"/>
+      <thm15:themeFamily xmlns:thm15="http://schemas.microsoft.com/office/thememl/2012/main" xmlns="" name="Office Theme" id="{62F939B6-93AF-4DB8-9C6B-D6C7DFDC589F}" vid="{4A3C46E8-61CC-4603-A589-7422A47A8E4A}"/>
     </a:ext>
   </a:extLst>
 </a:theme>

</xml_diff>